<commit_message>
Sauvegarde du 4 novembre
</commit_message>
<xml_diff>
--- a/doc/README_workflow.pptx
+++ b/doc/README_workflow.pptx
@@ -6,6 +6,7 @@
   </p:sldMasterIdLst>
   <p:sldIdLst>
     <p:sldId id="256" r:id="rId2"/>
+    <p:sldId id="257" r:id="rId3"/>
   </p:sldIdLst>
   <p:sldSz cx="6858000" cy="9906000" type="A4"/>
   <p:notesSz cx="6858000" cy="9144000"/>
@@ -104,6 +105,11 @@
       </a:defRPr>
     </a:lvl9pPr>
   </p:defaultTextStyle>
+  <p:extLst>
+    <p:ext uri="{EFAFB233-063F-42B5-8137-9DF3F51BA10A}">
+      <p15:sldGuideLst xmlns:p15="http://schemas.microsoft.com/office/powerpoint/2012/main"/>
+    </p:ext>
+  </p:extLst>
 </p:presentation>
 </file>
 
@@ -238,7 +244,7 @@
           <a:p>
             <a:fld id="{9D1EF9BC-167A-4958-9165-27D2C5388731}" type="datetimeFigureOut">
               <a:rPr lang="fr-FR" smtClean="0"/>
-              <a:t>21/09/2022</a:t>
+              <a:t>03/10/2022</a:t>
             </a:fld>
             <a:endParaRPr lang="fr-FR"/>
           </a:p>
@@ -408,7 +414,7 @@
           <a:p>
             <a:fld id="{9D1EF9BC-167A-4958-9165-27D2C5388731}" type="datetimeFigureOut">
               <a:rPr lang="fr-FR" smtClean="0"/>
-              <a:t>21/09/2022</a:t>
+              <a:t>03/10/2022</a:t>
             </a:fld>
             <a:endParaRPr lang="fr-FR"/>
           </a:p>
@@ -588,7 +594,7 @@
           <a:p>
             <a:fld id="{9D1EF9BC-167A-4958-9165-27D2C5388731}" type="datetimeFigureOut">
               <a:rPr lang="fr-FR" smtClean="0"/>
-              <a:t>21/09/2022</a:t>
+              <a:t>03/10/2022</a:t>
             </a:fld>
             <a:endParaRPr lang="fr-FR"/>
           </a:p>
@@ -758,7 +764,7 @@
           <a:p>
             <a:fld id="{9D1EF9BC-167A-4958-9165-27D2C5388731}" type="datetimeFigureOut">
               <a:rPr lang="fr-FR" smtClean="0"/>
-              <a:t>21/09/2022</a:t>
+              <a:t>03/10/2022</a:t>
             </a:fld>
             <a:endParaRPr lang="fr-FR"/>
           </a:p>
@@ -1002,7 +1008,7 @@
           <a:p>
             <a:fld id="{9D1EF9BC-167A-4958-9165-27D2C5388731}" type="datetimeFigureOut">
               <a:rPr lang="fr-FR" smtClean="0"/>
-              <a:t>21/09/2022</a:t>
+              <a:t>03/10/2022</a:t>
             </a:fld>
             <a:endParaRPr lang="fr-FR"/>
           </a:p>
@@ -1234,7 +1240,7 @@
           <a:p>
             <a:fld id="{9D1EF9BC-167A-4958-9165-27D2C5388731}" type="datetimeFigureOut">
               <a:rPr lang="fr-FR" smtClean="0"/>
-              <a:t>21/09/2022</a:t>
+              <a:t>03/10/2022</a:t>
             </a:fld>
             <a:endParaRPr lang="fr-FR"/>
           </a:p>
@@ -1601,7 +1607,7 @@
           <a:p>
             <a:fld id="{9D1EF9BC-167A-4958-9165-27D2C5388731}" type="datetimeFigureOut">
               <a:rPr lang="fr-FR" smtClean="0"/>
-              <a:t>21/09/2022</a:t>
+              <a:t>03/10/2022</a:t>
             </a:fld>
             <a:endParaRPr lang="fr-FR"/>
           </a:p>
@@ -1719,7 +1725,7 @@
           <a:p>
             <a:fld id="{9D1EF9BC-167A-4958-9165-27D2C5388731}" type="datetimeFigureOut">
               <a:rPr lang="fr-FR" smtClean="0"/>
-              <a:t>21/09/2022</a:t>
+              <a:t>03/10/2022</a:t>
             </a:fld>
             <a:endParaRPr lang="fr-FR"/>
           </a:p>
@@ -1814,7 +1820,7 @@
           <a:p>
             <a:fld id="{9D1EF9BC-167A-4958-9165-27D2C5388731}" type="datetimeFigureOut">
               <a:rPr lang="fr-FR" smtClean="0"/>
-              <a:t>21/09/2022</a:t>
+              <a:t>03/10/2022</a:t>
             </a:fld>
             <a:endParaRPr lang="fr-FR"/>
           </a:p>
@@ -2091,7 +2097,7 @@
           <a:p>
             <a:fld id="{9D1EF9BC-167A-4958-9165-27D2C5388731}" type="datetimeFigureOut">
               <a:rPr lang="fr-FR" smtClean="0"/>
-              <a:t>21/09/2022</a:t>
+              <a:t>03/10/2022</a:t>
             </a:fld>
             <a:endParaRPr lang="fr-FR"/>
           </a:p>
@@ -2348,7 +2354,7 @@
           <a:p>
             <a:fld id="{9D1EF9BC-167A-4958-9165-27D2C5388731}" type="datetimeFigureOut">
               <a:rPr lang="fr-FR" smtClean="0"/>
-              <a:t>21/09/2022</a:t>
+              <a:t>03/10/2022</a:t>
             </a:fld>
             <a:endParaRPr lang="fr-FR"/>
           </a:p>
@@ -2561,7 +2567,7 @@
           <a:p>
             <a:fld id="{9D1EF9BC-167A-4958-9165-27D2C5388731}" type="datetimeFigureOut">
               <a:rPr lang="fr-FR" smtClean="0"/>
-              <a:t>21/09/2022</a:t>
+              <a:t>03/10/2022</a:t>
             </a:fld>
             <a:endParaRPr lang="fr-FR"/>
           </a:p>
@@ -2968,6 +2974,118 @@
       </p:grpSpPr>
       <p:sp>
         <p:nvSpPr>
+          <p:cNvPr id="12" name="Rectangle 11">
+            <a:extLst>
+              <a:ext uri="{FF2B5EF4-FFF2-40B4-BE49-F238E27FC236}">
+                <a16:creationId xmlns:a16="http://schemas.microsoft.com/office/drawing/2014/main" id="{546374D4-535C-6913-48BE-FEB00EC1EEEC}"/>
+              </a:ext>
+            </a:extLst>
+          </p:cNvPr>
+          <p:cNvSpPr/>
+          <p:nvPr/>
+        </p:nvSpPr>
+        <p:spPr>
+          <a:xfrm>
+            <a:off x="263397" y="752262"/>
+            <a:ext cx="6373506" cy="4502644"/>
+          </a:xfrm>
+          <a:prstGeom prst="rect">
+            <a:avLst/>
+          </a:prstGeom>
+          <a:solidFill>
+            <a:srgbClr val="F7F7F7"/>
+          </a:solidFill>
+          <a:ln>
+            <a:solidFill>
+              <a:schemeClr val="bg1">
+                <a:lumMod val="75000"/>
+              </a:schemeClr>
+            </a:solidFill>
+          </a:ln>
+        </p:spPr>
+        <p:style>
+          <a:lnRef idx="2">
+            <a:schemeClr val="accent1">
+              <a:shade val="50000"/>
+            </a:schemeClr>
+          </a:lnRef>
+          <a:fillRef idx="1">
+            <a:schemeClr val="accent1"/>
+          </a:fillRef>
+          <a:effectRef idx="0">
+            <a:schemeClr val="accent1"/>
+          </a:effectRef>
+          <a:fontRef idx="minor">
+            <a:schemeClr val="lt1"/>
+          </a:fontRef>
+        </p:style>
+        <p:txBody>
+          <a:bodyPr rtlCol="0" anchor="ctr"/>
+          <a:lstStyle/>
+          <a:p>
+            <a:pPr algn="ctr"/>
+            <a:endParaRPr lang="fr-FR"/>
+          </a:p>
+        </p:txBody>
+      </p:sp>
+      <p:sp>
+        <p:nvSpPr>
+          <p:cNvPr id="2" name="Rectangle 1">
+            <a:extLst>
+              <a:ext uri="{FF2B5EF4-FFF2-40B4-BE49-F238E27FC236}">
+                <a16:creationId xmlns:a16="http://schemas.microsoft.com/office/drawing/2014/main" id="{7E9FD109-DA13-79B5-0C2C-B07B49BEB124}"/>
+              </a:ext>
+            </a:extLst>
+          </p:cNvPr>
+          <p:cNvSpPr/>
+          <p:nvPr/>
+        </p:nvSpPr>
+        <p:spPr>
+          <a:xfrm>
+            <a:off x="263397" y="5363326"/>
+            <a:ext cx="6373505" cy="4096612"/>
+          </a:xfrm>
+          <a:prstGeom prst="rect">
+            <a:avLst/>
+          </a:prstGeom>
+          <a:solidFill>
+            <a:srgbClr val="F7F7F7"/>
+          </a:solidFill>
+          <a:ln>
+            <a:solidFill>
+              <a:schemeClr val="bg1">
+                <a:lumMod val="75000"/>
+              </a:schemeClr>
+            </a:solidFill>
+          </a:ln>
+        </p:spPr>
+        <p:style>
+          <a:lnRef idx="2">
+            <a:schemeClr val="accent1">
+              <a:shade val="50000"/>
+            </a:schemeClr>
+          </a:lnRef>
+          <a:fillRef idx="1">
+            <a:schemeClr val="accent1"/>
+          </a:fillRef>
+          <a:effectRef idx="0">
+            <a:schemeClr val="accent1"/>
+          </a:effectRef>
+          <a:fontRef idx="minor">
+            <a:schemeClr val="lt1"/>
+          </a:fontRef>
+        </p:style>
+        <p:txBody>
+          <a:bodyPr rtlCol="0" anchor="ctr"/>
+          <a:lstStyle/>
+          <a:p>
+            <a:pPr algn="ctr"/>
+            <a:endParaRPr lang="fr-FR"/>
+          </a:p>
+        </p:txBody>
+      </p:sp>
+      <p:sp>
+        <p:nvSpPr>
           <p:cNvPr id="4" name="ZoneTexte 3">
             <a:extLst>
               <a:ext uri="{FF2B5EF4-FFF2-40B4-BE49-F238E27FC236}">
@@ -2980,7 +3098,7 @@
         </p:nvSpPr>
         <p:spPr>
           <a:xfrm>
-            <a:off x="2616621" y="1078172"/>
+            <a:off x="2944171" y="953599"/>
             <a:ext cx="2753433" cy="307777"/>
           </a:xfrm>
           <a:prstGeom prst="rect">
@@ -3022,7 +3140,7 @@
         </p:nvSpPr>
         <p:spPr>
           <a:xfrm>
-            <a:off x="2821754" y="1883136"/>
+            <a:off x="3149304" y="1758563"/>
             <a:ext cx="2343166" cy="317937"/>
           </a:xfrm>
           <a:prstGeom prst="rect">
@@ -3064,7 +3182,7 @@
         </p:nvSpPr>
         <p:spPr>
           <a:xfrm>
-            <a:off x="2760338" y="2688100"/>
+            <a:off x="3087888" y="2563527"/>
             <a:ext cx="2465998" cy="307777"/>
           </a:xfrm>
           <a:prstGeom prst="rect">
@@ -3106,7 +3224,7 @@
         </p:nvSpPr>
         <p:spPr>
           <a:xfrm>
-            <a:off x="2670775" y="3493064"/>
+            <a:off x="2998325" y="3368491"/>
             <a:ext cx="2645124" cy="307777"/>
           </a:xfrm>
           <a:prstGeom prst="rect">
@@ -3148,7 +3266,7 @@
         </p:nvSpPr>
         <p:spPr>
           <a:xfrm>
-            <a:off x="2377444" y="4298027"/>
+            <a:off x="2704994" y="4147899"/>
             <a:ext cx="3231786" cy="317937"/>
           </a:xfrm>
           <a:prstGeom prst="rect">
@@ -3190,7 +3308,7 @@
         </p:nvSpPr>
         <p:spPr>
           <a:xfrm>
-            <a:off x="470038" y="5399904"/>
+            <a:off x="959516" y="5717116"/>
             <a:ext cx="2150659" cy="523220"/>
           </a:xfrm>
           <a:prstGeom prst="rect">
@@ -3243,7 +3361,7 @@
         </p:nvSpPr>
         <p:spPr>
           <a:xfrm>
-            <a:off x="867689" y="6446344"/>
+            <a:off x="1019582" y="6698436"/>
             <a:ext cx="2150659" cy="523220"/>
           </a:xfrm>
           <a:prstGeom prst="rect">
@@ -3296,7 +3414,7 @@
         </p:nvSpPr>
         <p:spPr>
           <a:xfrm>
-            <a:off x="4687676" y="5786140"/>
+            <a:off x="4404714" y="6175216"/>
             <a:ext cx="1700286" cy="523220"/>
           </a:xfrm>
           <a:prstGeom prst="rect">
@@ -3351,7 +3469,7 @@
         </p:nvCxnSpPr>
         <p:spPr>
           <a:xfrm>
-            <a:off x="3912852" y="1427183"/>
+            <a:off x="4320887" y="1302610"/>
             <a:ext cx="0" cy="435632"/>
           </a:xfrm>
           <a:prstGeom prst="straightConnector1">
@@ -3385,12 +3503,14 @@
               </a:ext>
             </a:extLst>
           </p:cNvPr>
-          <p:cNvCxnSpPr/>
+          <p:cNvCxnSpPr>
+            <a:cxnSpLocks/>
+          </p:cNvCxnSpPr>
           <p:nvPr/>
         </p:nvCxnSpPr>
         <p:spPr>
           <a:xfrm>
-            <a:off x="3912851" y="2242307"/>
+            <a:off x="4320887" y="2117734"/>
             <a:ext cx="0" cy="435632"/>
           </a:xfrm>
           <a:prstGeom prst="straightConnector1">
@@ -3424,12 +3544,14 @@
               </a:ext>
             </a:extLst>
           </p:cNvPr>
-          <p:cNvCxnSpPr/>
+          <p:cNvCxnSpPr>
+            <a:cxnSpLocks/>
+          </p:cNvCxnSpPr>
           <p:nvPr/>
         </p:nvCxnSpPr>
         <p:spPr>
           <a:xfrm>
-            <a:off x="3923011" y="3037111"/>
+            <a:off x="4320887" y="2912538"/>
             <a:ext cx="0" cy="435632"/>
           </a:xfrm>
           <a:prstGeom prst="straightConnector1">
@@ -3463,12 +3585,14 @@
               </a:ext>
             </a:extLst>
           </p:cNvPr>
-          <p:cNvCxnSpPr/>
+          <p:cNvCxnSpPr>
+            <a:cxnSpLocks/>
+          </p:cNvCxnSpPr>
           <p:nvPr/>
         </p:nvCxnSpPr>
         <p:spPr>
           <a:xfrm>
-            <a:off x="3923011" y="3842075"/>
+            <a:off x="4320887" y="3717502"/>
             <a:ext cx="0" cy="435632"/>
           </a:xfrm>
           <a:prstGeom prst="straightConnector1">
@@ -3507,7 +3631,7 @@
         </p:nvSpPr>
         <p:spPr>
           <a:xfrm rot="20390314">
-            <a:off x="83365" y="2579286"/>
+            <a:off x="496453" y="2430185"/>
             <a:ext cx="2150659" cy="307777"/>
           </a:xfrm>
           <a:prstGeom prst="rect">
@@ -3546,7 +3670,7 @@
         </p:nvSpPr>
         <p:spPr>
           <a:xfrm rot="20390314">
-            <a:off x="135445" y="130599"/>
+            <a:off x="653239" y="-98629"/>
             <a:ext cx="1464488" cy="738664"/>
           </a:xfrm>
           <a:prstGeom prst="rect">
@@ -3607,7 +3731,7 @@
         </p:nvCxnSpPr>
         <p:spPr>
           <a:xfrm>
-            <a:off x="867689" y="3042403"/>
+            <a:off x="1280777" y="2893302"/>
             <a:ext cx="1625600" cy="606623"/>
           </a:xfrm>
           <a:prstGeom prst="curvedConnector3">
@@ -3648,7 +3772,7 @@
         </p:nvCxnSpPr>
         <p:spPr>
           <a:xfrm>
-            <a:off x="869562" y="872913"/>
+            <a:off x="1489021" y="695742"/>
             <a:ext cx="1351612" cy="367861"/>
           </a:xfrm>
           <a:prstGeom prst="curvedConnector3">
@@ -3687,7 +3811,7 @@
         </p:nvSpPr>
         <p:spPr>
           <a:xfrm>
-            <a:off x="4974608" y="116815"/>
+            <a:off x="4974608" y="177775"/>
             <a:ext cx="1763176" cy="307777"/>
           </a:xfrm>
           <a:prstGeom prst="rect">
@@ -3751,8 +3875,8 @@
         </p:nvSpPr>
         <p:spPr>
           <a:xfrm>
-            <a:off x="4124465" y="4599371"/>
-            <a:ext cx="1361935" cy="461665"/>
+            <a:off x="3243965" y="4500561"/>
+            <a:ext cx="2153845" cy="461665"/>
           </a:xfrm>
           <a:prstGeom prst="rect">
             <a:avLst/>
@@ -3765,29 +3889,55 @@
           </a:bodyPr>
           <a:lstStyle/>
           <a:p>
-            <a:r>
-              <a:rPr lang="fr-FR" sz="1200" i="1" u="sng" dirty="0" err="1"/>
-              <a:t>choose</a:t>
-            </a:r>
-            <a:r>
-              <a:rPr lang="fr-FR" sz="1200" i="1" u="sng" dirty="0"/>
-              <a:t> merge file</a:t>
-            </a:r>
-          </a:p>
-          <a:p>
-            <a:r>
-              <a:rPr lang="fr-FR" sz="1200" i="1" u="sng" dirty="0" err="1"/>
-              <a:t>choose</a:t>
-            </a:r>
-            <a:r>
-              <a:rPr lang="fr-FR" sz="1200" i="1" u="sng" dirty="0"/>
-              <a:t> </a:t>
-            </a:r>
-            <a:r>
-              <a:rPr lang="fr-FR" sz="1200" i="1" u="sng" dirty="0" err="1"/>
-              <a:t>resolution</a:t>
-            </a:r>
-            <a:endParaRPr lang="fr-FR" sz="1200" i="1" u="sng" dirty="0"/>
+            <a:pPr algn="ctr"/>
+            <a:r>
+              <a:rPr lang="fr-FR" sz="1200" i="1" u="sng" dirty="0" err="1">
+                <a:solidFill>
+                  <a:srgbClr val="002060"/>
+                </a:solidFill>
+              </a:rPr>
+              <a:t>Two</a:t>
+            </a:r>
+            <a:r>
+              <a:rPr lang="fr-FR" sz="1200" i="1" u="sng" dirty="0">
+                <a:solidFill>
+                  <a:srgbClr val="002060"/>
+                </a:solidFill>
+              </a:rPr>
+              <a:t> possible merge formats</a:t>
+            </a:r>
+          </a:p>
+          <a:p>
+            <a:pPr algn="ctr"/>
+            <a:r>
+              <a:rPr lang="fr-FR" sz="1200" i="1" u="sng" dirty="0" err="1">
+                <a:solidFill>
+                  <a:srgbClr val="002060"/>
+                </a:solidFill>
+              </a:rPr>
+              <a:t>Two</a:t>
+            </a:r>
+            <a:r>
+              <a:rPr lang="fr-FR" sz="1200" i="1" u="sng" dirty="0">
+                <a:solidFill>
+                  <a:srgbClr val="002060"/>
+                </a:solidFill>
+              </a:rPr>
+              <a:t> possible cluster </a:t>
+            </a:r>
+            <a:r>
+              <a:rPr lang="fr-FR" sz="1200" i="1" u="sng" dirty="0" err="1">
+                <a:solidFill>
+                  <a:srgbClr val="002060"/>
+                </a:solidFill>
+              </a:rPr>
+              <a:t>resolutions</a:t>
+            </a:r>
+            <a:endParaRPr lang="fr-FR" sz="1200" i="1" u="sng" dirty="0">
+              <a:solidFill>
+                <a:srgbClr val="002060"/>
+              </a:solidFill>
+            </a:endParaRPr>
           </a:p>
         </p:txBody>
       </p:sp>
@@ -3807,7 +3957,7 @@
         </p:nvCxnSpPr>
         <p:spPr>
           <a:xfrm flipH="1">
-            <a:off x="2760338" y="4806386"/>
+            <a:off x="3198514" y="5054996"/>
             <a:ext cx="1122373" cy="630269"/>
           </a:xfrm>
           <a:prstGeom prst="straightConnector1">
@@ -3846,7 +3996,7 @@
         </p:nvCxnSpPr>
         <p:spPr>
           <a:xfrm flipH="1">
-            <a:off x="2821754" y="4806386"/>
+            <a:off x="3259930" y="5054996"/>
             <a:ext cx="1060957" cy="1502974"/>
           </a:xfrm>
           <a:prstGeom prst="straightConnector1">
@@ -3885,7 +4035,7 @@
         </p:nvCxnSpPr>
         <p:spPr>
           <a:xfrm>
-            <a:off x="3882711" y="4809538"/>
+            <a:off x="4320887" y="5058148"/>
             <a:ext cx="750249" cy="960997"/>
           </a:xfrm>
           <a:prstGeom prst="straightConnector1">
@@ -3910,10 +4060,1008 @@
           </a:fontRef>
         </p:style>
       </p:cxnSp>
+      <p:sp>
+        <p:nvSpPr>
+          <p:cNvPr id="3" name="ZoneTexte 2">
+            <a:extLst>
+              <a:ext uri="{FF2B5EF4-FFF2-40B4-BE49-F238E27FC236}">
+                <a16:creationId xmlns:a16="http://schemas.microsoft.com/office/drawing/2014/main" id="{C67CD655-A3A1-8FF8-F432-53088F320D1E}"/>
+              </a:ext>
+            </a:extLst>
+          </p:cNvPr>
+          <p:cNvSpPr txBox="1"/>
+          <p:nvPr/>
+        </p:nvSpPr>
+        <p:spPr>
+          <a:xfrm rot="16200000">
+            <a:off x="4607955" y="2699720"/>
+            <a:ext cx="3564548" cy="369332"/>
+          </a:xfrm>
+          <a:prstGeom prst="rect">
+            <a:avLst/>
+          </a:prstGeom>
+          <a:noFill/>
+        </p:spPr>
+        <p:txBody>
+          <a:bodyPr wrap="square" rtlCol="0">
+            <a:spAutoFit/>
+          </a:bodyPr>
+          <a:lstStyle/>
+          <a:p>
+            <a:pPr algn="ctr"/>
+            <a:r>
+              <a:rPr lang="fr-FR" b="1" dirty="0">
+                <a:solidFill>
+                  <a:schemeClr val="bg1">
+                    <a:lumMod val="65000"/>
+                  </a:schemeClr>
+                </a:solidFill>
+              </a:rPr>
+              <a:t>DATA CLEANING AND FILTERING</a:t>
+            </a:r>
+          </a:p>
+        </p:txBody>
+      </p:sp>
+      <p:sp>
+        <p:nvSpPr>
+          <p:cNvPr id="18" name="ZoneTexte 17">
+            <a:extLst>
+              <a:ext uri="{FF2B5EF4-FFF2-40B4-BE49-F238E27FC236}">
+                <a16:creationId xmlns:a16="http://schemas.microsoft.com/office/drawing/2014/main" id="{03935B7D-30C8-E939-932E-F2CC802BB209}"/>
+              </a:ext>
+            </a:extLst>
+          </p:cNvPr>
+          <p:cNvSpPr txBox="1"/>
+          <p:nvPr/>
+        </p:nvSpPr>
+        <p:spPr>
+          <a:xfrm rot="16200000">
+            <a:off x="4984313" y="7226967"/>
+            <a:ext cx="2825086" cy="369332"/>
+          </a:xfrm>
+          <a:prstGeom prst="rect">
+            <a:avLst/>
+          </a:prstGeom>
+          <a:noFill/>
+        </p:spPr>
+        <p:txBody>
+          <a:bodyPr wrap="square" rtlCol="0">
+            <a:spAutoFit/>
+          </a:bodyPr>
+          <a:lstStyle/>
+          <a:p>
+            <a:r>
+              <a:rPr lang="fr-FR" b="1" dirty="0">
+                <a:solidFill>
+                  <a:schemeClr val="bg1">
+                    <a:lumMod val="65000"/>
+                  </a:schemeClr>
+                </a:solidFill>
+              </a:rPr>
+              <a:t>DOWNSTREAM ANALYSIS</a:t>
+            </a:r>
+          </a:p>
+        </p:txBody>
+      </p:sp>
     </p:spTree>
     <p:extLst>
       <p:ext uri="{BB962C8B-B14F-4D97-AF65-F5344CB8AC3E}">
         <p14:creationId xmlns:p14="http://schemas.microsoft.com/office/powerpoint/2010/main" val="2971349836"/>
+      </p:ext>
+    </p:extLst>
+  </p:cSld>
+  <p:clrMapOvr>
+    <a:masterClrMapping/>
+  </p:clrMapOvr>
+</p:sld>
+</file>
+
+<file path=ppt/slides/slide2.xml><?xml version="1.0" encoding="utf-8"?>
+<p:sld xmlns:a="http://schemas.openxmlformats.org/drawingml/2006/main" xmlns:r="http://schemas.openxmlformats.org/officeDocument/2006/relationships" xmlns:p="http://schemas.openxmlformats.org/presentationml/2006/main">
+  <p:cSld>
+    <p:spTree>
+      <p:nvGrpSpPr>
+        <p:cNvPr id="1" name=""/>
+        <p:cNvGrpSpPr/>
+        <p:nvPr/>
+      </p:nvGrpSpPr>
+      <p:grpSpPr>
+        <a:xfrm>
+          <a:off x="0" y="0"/>
+          <a:ext cx="0" cy="0"/>
+          <a:chOff x="0" y="0"/>
+          <a:chExt cx="0" cy="0"/>
+        </a:xfrm>
+      </p:grpSpPr>
+      <p:sp>
+        <p:nvSpPr>
+          <p:cNvPr id="12" name="Rectangle 11">
+            <a:extLst>
+              <a:ext uri="{FF2B5EF4-FFF2-40B4-BE49-F238E27FC236}">
+                <a16:creationId xmlns:a16="http://schemas.microsoft.com/office/drawing/2014/main" id="{546374D4-535C-6913-48BE-FEB00EC1EEEC}"/>
+              </a:ext>
+            </a:extLst>
+          </p:cNvPr>
+          <p:cNvSpPr/>
+          <p:nvPr/>
+        </p:nvSpPr>
+        <p:spPr>
+          <a:xfrm>
+            <a:off x="263397" y="752262"/>
+            <a:ext cx="6373506" cy="3790412"/>
+          </a:xfrm>
+          <a:prstGeom prst="rect">
+            <a:avLst/>
+          </a:prstGeom>
+          <a:solidFill>
+            <a:srgbClr val="F7F7F7"/>
+          </a:solidFill>
+          <a:ln>
+            <a:solidFill>
+              <a:schemeClr val="bg1">
+                <a:lumMod val="75000"/>
+              </a:schemeClr>
+            </a:solidFill>
+          </a:ln>
+        </p:spPr>
+        <p:style>
+          <a:lnRef idx="2">
+            <a:schemeClr val="accent1">
+              <a:shade val="50000"/>
+            </a:schemeClr>
+          </a:lnRef>
+          <a:fillRef idx="1">
+            <a:schemeClr val="accent1"/>
+          </a:fillRef>
+          <a:effectRef idx="0">
+            <a:schemeClr val="accent1"/>
+          </a:effectRef>
+          <a:fontRef idx="minor">
+            <a:schemeClr val="lt1"/>
+          </a:fontRef>
+        </p:style>
+        <p:txBody>
+          <a:bodyPr rtlCol="0" anchor="ctr"/>
+          <a:lstStyle/>
+          <a:p>
+            <a:pPr algn="ctr"/>
+            <a:endParaRPr lang="fr-FR"/>
+          </a:p>
+        </p:txBody>
+      </p:sp>
+      <p:sp>
+        <p:nvSpPr>
+          <p:cNvPr id="2" name="Rectangle 1">
+            <a:extLst>
+              <a:ext uri="{FF2B5EF4-FFF2-40B4-BE49-F238E27FC236}">
+                <a16:creationId xmlns:a16="http://schemas.microsoft.com/office/drawing/2014/main" id="{7E9FD109-DA13-79B5-0C2C-B07B49BEB124}"/>
+              </a:ext>
+            </a:extLst>
+          </p:cNvPr>
+          <p:cNvSpPr/>
+          <p:nvPr/>
+        </p:nvSpPr>
+        <p:spPr>
+          <a:xfrm>
+            <a:off x="263397" y="4666660"/>
+            <a:ext cx="6373505" cy="4793278"/>
+          </a:xfrm>
+          <a:prstGeom prst="rect">
+            <a:avLst/>
+          </a:prstGeom>
+          <a:solidFill>
+            <a:srgbClr val="F7F7F7"/>
+          </a:solidFill>
+          <a:ln>
+            <a:solidFill>
+              <a:schemeClr val="bg1">
+                <a:lumMod val="75000"/>
+              </a:schemeClr>
+            </a:solidFill>
+          </a:ln>
+        </p:spPr>
+        <p:style>
+          <a:lnRef idx="2">
+            <a:schemeClr val="accent1">
+              <a:shade val="50000"/>
+            </a:schemeClr>
+          </a:lnRef>
+          <a:fillRef idx="1">
+            <a:schemeClr val="accent1"/>
+          </a:fillRef>
+          <a:effectRef idx="0">
+            <a:schemeClr val="accent1"/>
+          </a:effectRef>
+          <a:fontRef idx="minor">
+            <a:schemeClr val="lt1"/>
+          </a:fontRef>
+        </p:style>
+        <p:txBody>
+          <a:bodyPr rtlCol="0" anchor="ctr"/>
+          <a:lstStyle/>
+          <a:p>
+            <a:pPr algn="ctr"/>
+            <a:endParaRPr lang="fr-FR"/>
+          </a:p>
+        </p:txBody>
+      </p:sp>
+      <p:sp>
+        <p:nvSpPr>
+          <p:cNvPr id="4" name="ZoneTexte 3">
+            <a:extLst>
+              <a:ext uri="{FF2B5EF4-FFF2-40B4-BE49-F238E27FC236}">
+                <a16:creationId xmlns:a16="http://schemas.microsoft.com/office/drawing/2014/main" id="{BF0B8EFB-8208-3132-FA69-639DCAC96D36}"/>
+              </a:ext>
+            </a:extLst>
+          </p:cNvPr>
+          <p:cNvSpPr txBox="1"/>
+          <p:nvPr/>
+        </p:nvSpPr>
+        <p:spPr>
+          <a:xfrm>
+            <a:off x="2764168" y="953599"/>
+            <a:ext cx="3379386" cy="307777"/>
+          </a:xfrm>
+          <a:prstGeom prst="rect">
+            <a:avLst/>
+          </a:prstGeom>
+          <a:solidFill>
+            <a:schemeClr val="accent5">
+              <a:lumMod val="20000"/>
+              <a:lumOff val="80000"/>
+            </a:schemeClr>
+          </a:solidFill>
+        </p:spPr>
+        <p:txBody>
+          <a:bodyPr wrap="square" rtlCol="0">
+            <a:spAutoFit/>
+          </a:bodyPr>
+          <a:lstStyle/>
+          <a:p>
+            <a:pPr algn="ctr"/>
+            <a:r>
+              <a:rPr lang="fr-FR" sz="1400" dirty="0" err="1"/>
+              <a:t>scRNAseq_CITEseq_ind_CreateSeuratObject</a:t>
+            </a:r>
+            <a:endParaRPr lang="fr-FR" sz="1400" dirty="0"/>
+          </a:p>
+        </p:txBody>
+      </p:sp>
+      <p:sp>
+        <p:nvSpPr>
+          <p:cNvPr id="5" name="ZoneTexte 4">
+            <a:extLst>
+              <a:ext uri="{FF2B5EF4-FFF2-40B4-BE49-F238E27FC236}">
+                <a16:creationId xmlns:a16="http://schemas.microsoft.com/office/drawing/2014/main" id="{E248E638-639C-21B3-42AB-47371284C5B8}"/>
+              </a:ext>
+            </a:extLst>
+          </p:cNvPr>
+          <p:cNvSpPr txBox="1"/>
+          <p:nvPr/>
+        </p:nvSpPr>
+        <p:spPr>
+          <a:xfrm>
+            <a:off x="2926685" y="1665426"/>
+            <a:ext cx="2737908" cy="307777"/>
+          </a:xfrm>
+          <a:prstGeom prst="rect">
+            <a:avLst/>
+          </a:prstGeom>
+          <a:solidFill>
+            <a:schemeClr val="accent5">
+              <a:lumMod val="20000"/>
+              <a:lumOff val="80000"/>
+            </a:schemeClr>
+          </a:solidFill>
+        </p:spPr>
+        <p:txBody>
+          <a:bodyPr wrap="square" rtlCol="0">
+            <a:spAutoFit/>
+          </a:bodyPr>
+          <a:lstStyle/>
+          <a:p>
+            <a:pPr algn="ctr"/>
+            <a:r>
+              <a:rPr lang="fr-FR" sz="1400" dirty="0" err="1"/>
+              <a:t>scRNAseq_CITEseq_ind_FilterData</a:t>
+            </a:r>
+            <a:endParaRPr lang="fr-FR" sz="1400" dirty="0"/>
+          </a:p>
+        </p:txBody>
+      </p:sp>
+      <p:sp>
+        <p:nvSpPr>
+          <p:cNvPr id="6" name="ZoneTexte 5">
+            <a:extLst>
+              <a:ext uri="{FF2B5EF4-FFF2-40B4-BE49-F238E27FC236}">
+                <a16:creationId xmlns:a16="http://schemas.microsoft.com/office/drawing/2014/main" id="{88BE4869-4CB7-D0E9-D4E2-292ADF3D1E3D}"/>
+              </a:ext>
+            </a:extLst>
+          </p:cNvPr>
+          <p:cNvSpPr txBox="1"/>
+          <p:nvPr/>
+        </p:nvSpPr>
+        <p:spPr>
+          <a:xfrm>
+            <a:off x="2439538" y="3099970"/>
+            <a:ext cx="3640738" cy="307777"/>
+          </a:xfrm>
+          <a:prstGeom prst="rect">
+            <a:avLst/>
+          </a:prstGeom>
+          <a:solidFill>
+            <a:schemeClr val="accent5">
+              <a:lumMod val="20000"/>
+              <a:lumOff val="80000"/>
+            </a:schemeClr>
+          </a:solidFill>
+        </p:spPr>
+        <p:txBody>
+          <a:bodyPr wrap="square" rtlCol="0">
+            <a:spAutoFit/>
+          </a:bodyPr>
+          <a:lstStyle/>
+          <a:p>
+            <a:pPr algn="ctr"/>
+            <a:r>
+              <a:rPr lang="fr-FR" sz="1400" dirty="0" err="1"/>
+              <a:t>scRNAseq_CITEseq_integ_IntegrateConditions</a:t>
+            </a:r>
+            <a:endParaRPr lang="fr-FR" sz="1400" dirty="0"/>
+          </a:p>
+        </p:txBody>
+      </p:sp>
+      <p:sp>
+        <p:nvSpPr>
+          <p:cNvPr id="8" name="ZoneTexte 7">
+            <a:extLst>
+              <a:ext uri="{FF2B5EF4-FFF2-40B4-BE49-F238E27FC236}">
+                <a16:creationId xmlns:a16="http://schemas.microsoft.com/office/drawing/2014/main" id="{B19CCBE3-E779-E58C-47D6-602925EA445A}"/>
+              </a:ext>
+            </a:extLst>
+          </p:cNvPr>
+          <p:cNvSpPr txBox="1"/>
+          <p:nvPr/>
+        </p:nvSpPr>
+        <p:spPr>
+          <a:xfrm>
+            <a:off x="2669424" y="2379482"/>
+            <a:ext cx="3231786" cy="317937"/>
+          </a:xfrm>
+          <a:prstGeom prst="rect">
+            <a:avLst/>
+          </a:prstGeom>
+          <a:solidFill>
+            <a:schemeClr val="accent5">
+              <a:lumMod val="20000"/>
+              <a:lumOff val="80000"/>
+            </a:schemeClr>
+          </a:solidFill>
+        </p:spPr>
+        <p:txBody>
+          <a:bodyPr wrap="square" rtlCol="0">
+            <a:spAutoFit/>
+          </a:bodyPr>
+          <a:lstStyle/>
+          <a:p>
+            <a:pPr algn="ctr"/>
+            <a:r>
+              <a:rPr lang="fr-FR" sz="1400" dirty="0" err="1"/>
+              <a:t>scRNAseq_CITEseq_ind_NormalizeData</a:t>
+            </a:r>
+            <a:endParaRPr lang="fr-FR" sz="1400" dirty="0"/>
+          </a:p>
+        </p:txBody>
+      </p:sp>
+      <p:cxnSp>
+        <p:nvCxnSpPr>
+          <p:cNvPr id="13" name="Connecteur droit avec flèche 12">
+            <a:extLst>
+              <a:ext uri="{FF2B5EF4-FFF2-40B4-BE49-F238E27FC236}">
+                <a16:creationId xmlns:a16="http://schemas.microsoft.com/office/drawing/2014/main" id="{83270018-513E-58B4-9E02-4E813F3E3210}"/>
+              </a:ext>
+            </a:extLst>
+          </p:cNvPr>
+          <p:cNvCxnSpPr>
+            <a:cxnSpLocks/>
+          </p:cNvCxnSpPr>
+          <p:nvPr/>
+        </p:nvCxnSpPr>
+        <p:spPr>
+          <a:xfrm>
+            <a:off x="4320887" y="1312329"/>
+            <a:ext cx="0" cy="298909"/>
+          </a:xfrm>
+          <a:prstGeom prst="straightConnector1">
+            <a:avLst/>
+          </a:prstGeom>
+          <a:ln>
+            <a:tailEnd type="triangle"/>
+          </a:ln>
+        </p:spPr>
+        <p:style>
+          <a:lnRef idx="1">
+            <a:schemeClr val="dk1"/>
+          </a:lnRef>
+          <a:fillRef idx="0">
+            <a:schemeClr val="dk1"/>
+          </a:fillRef>
+          <a:effectRef idx="0">
+            <a:schemeClr val="dk1"/>
+          </a:effectRef>
+          <a:fontRef idx="minor">
+            <a:schemeClr val="tx1"/>
+          </a:fontRef>
+        </p:style>
+      </p:cxnSp>
+      <p:cxnSp>
+        <p:nvCxnSpPr>
+          <p:cNvPr id="14" name="Connecteur droit avec flèche 13">
+            <a:extLst>
+              <a:ext uri="{FF2B5EF4-FFF2-40B4-BE49-F238E27FC236}">
+                <a16:creationId xmlns:a16="http://schemas.microsoft.com/office/drawing/2014/main" id="{5AF8F9D9-4FA1-65C9-3C17-5D7CB5AB2A12}"/>
+              </a:ext>
+            </a:extLst>
+          </p:cNvPr>
+          <p:cNvCxnSpPr>
+            <a:cxnSpLocks/>
+          </p:cNvCxnSpPr>
+          <p:nvPr/>
+        </p:nvCxnSpPr>
+        <p:spPr>
+          <a:xfrm>
+            <a:off x="4320887" y="2031997"/>
+            <a:ext cx="0" cy="318166"/>
+          </a:xfrm>
+          <a:prstGeom prst="straightConnector1">
+            <a:avLst/>
+          </a:prstGeom>
+          <a:ln>
+            <a:tailEnd type="triangle"/>
+          </a:ln>
+        </p:spPr>
+        <p:style>
+          <a:lnRef idx="1">
+            <a:schemeClr val="dk1"/>
+          </a:lnRef>
+          <a:fillRef idx="0">
+            <a:schemeClr val="dk1"/>
+          </a:fillRef>
+          <a:effectRef idx="0">
+            <a:schemeClr val="dk1"/>
+          </a:effectRef>
+          <a:fontRef idx="minor">
+            <a:schemeClr val="tx1"/>
+          </a:fontRef>
+        </p:style>
+      </p:cxnSp>
+      <p:cxnSp>
+        <p:nvCxnSpPr>
+          <p:cNvPr id="15" name="Connecteur droit avec flèche 14">
+            <a:extLst>
+              <a:ext uri="{FF2B5EF4-FFF2-40B4-BE49-F238E27FC236}">
+                <a16:creationId xmlns:a16="http://schemas.microsoft.com/office/drawing/2014/main" id="{1921FC85-2E0C-2A78-BB91-C968FA1DCB0D}"/>
+              </a:ext>
+            </a:extLst>
+          </p:cNvPr>
+          <p:cNvCxnSpPr>
+            <a:cxnSpLocks/>
+          </p:cNvCxnSpPr>
+          <p:nvPr/>
+        </p:nvCxnSpPr>
+        <p:spPr>
+          <a:xfrm>
+            <a:off x="4320887" y="2734728"/>
+            <a:ext cx="0" cy="300170"/>
+          </a:xfrm>
+          <a:prstGeom prst="straightConnector1">
+            <a:avLst/>
+          </a:prstGeom>
+          <a:ln>
+            <a:tailEnd type="triangle"/>
+          </a:ln>
+        </p:spPr>
+        <p:style>
+          <a:lnRef idx="1">
+            <a:schemeClr val="dk1"/>
+          </a:lnRef>
+          <a:fillRef idx="0">
+            <a:schemeClr val="dk1"/>
+          </a:fillRef>
+          <a:effectRef idx="0">
+            <a:schemeClr val="dk1"/>
+          </a:effectRef>
+          <a:fontRef idx="minor">
+            <a:schemeClr val="tx1"/>
+          </a:fontRef>
+        </p:style>
+      </p:cxnSp>
+      <p:sp>
+        <p:nvSpPr>
+          <p:cNvPr id="21" name="ZoneTexte 20">
+            <a:extLst>
+              <a:ext uri="{FF2B5EF4-FFF2-40B4-BE49-F238E27FC236}">
+                <a16:creationId xmlns:a16="http://schemas.microsoft.com/office/drawing/2014/main" id="{40CE1592-F872-04E1-4AB1-C411BF296373}"/>
+              </a:ext>
+            </a:extLst>
+          </p:cNvPr>
+          <p:cNvSpPr txBox="1"/>
+          <p:nvPr/>
+        </p:nvSpPr>
+        <p:spPr>
+          <a:xfrm rot="20390314">
+            <a:off x="271100" y="197945"/>
+            <a:ext cx="1464488" cy="738664"/>
+          </a:xfrm>
+          <a:prstGeom prst="rect">
+            <a:avLst/>
+          </a:prstGeom>
+          <a:noFill/>
+        </p:spPr>
+        <p:txBody>
+          <a:bodyPr wrap="square" rtlCol="0">
+            <a:spAutoFit/>
+          </a:bodyPr>
+          <a:lstStyle/>
+          <a:p>
+            <a:r>
+              <a:rPr lang="fr-FR" sz="1400" b="1" dirty="0">
+                <a:solidFill>
+                  <a:srgbClr val="7030A0"/>
+                </a:solidFill>
+              </a:rPr>
+              <a:t>matrix.mtx.gz</a:t>
+            </a:r>
+          </a:p>
+          <a:p>
+            <a:r>
+              <a:rPr lang="fr-FR" sz="1400" b="1" dirty="0" err="1">
+                <a:solidFill>
+                  <a:srgbClr val="7030A0"/>
+                </a:solidFill>
+              </a:rPr>
+              <a:t>barcodes</a:t>
+            </a:r>
+            <a:endParaRPr lang="fr-FR" sz="1400" b="1" dirty="0">
+              <a:solidFill>
+                <a:srgbClr val="7030A0"/>
+              </a:solidFill>
+            </a:endParaRPr>
+          </a:p>
+          <a:p>
+            <a:r>
+              <a:rPr lang="fr-FR" sz="1400" b="1" dirty="0" err="1">
+                <a:solidFill>
+                  <a:srgbClr val="7030A0"/>
+                </a:solidFill>
+              </a:rPr>
+              <a:t>features</a:t>
+            </a:r>
+            <a:endParaRPr lang="fr-FR" sz="1400" b="1" dirty="0">
+              <a:solidFill>
+                <a:srgbClr val="7030A0"/>
+              </a:solidFill>
+            </a:endParaRPr>
+          </a:p>
+        </p:txBody>
+      </p:sp>
+      <p:cxnSp>
+        <p:nvCxnSpPr>
+          <p:cNvPr id="24" name="Connecteur : en arc 23">
+            <a:extLst>
+              <a:ext uri="{FF2B5EF4-FFF2-40B4-BE49-F238E27FC236}">
+                <a16:creationId xmlns:a16="http://schemas.microsoft.com/office/drawing/2014/main" id="{4BD99294-18F3-0201-EC48-1A2C130C49C5}"/>
+              </a:ext>
+            </a:extLst>
+          </p:cNvPr>
+          <p:cNvCxnSpPr>
+            <a:cxnSpLocks/>
+          </p:cNvCxnSpPr>
+          <p:nvPr/>
+        </p:nvCxnSpPr>
+        <p:spPr>
+          <a:xfrm>
+            <a:off x="1156194" y="485552"/>
+            <a:ext cx="1521618" cy="673001"/>
+          </a:xfrm>
+          <a:prstGeom prst="curvedConnector3">
+            <a:avLst/>
+          </a:prstGeom>
+          <a:ln>
+            <a:tailEnd type="triangle"/>
+          </a:ln>
+        </p:spPr>
+        <p:style>
+          <a:lnRef idx="1">
+            <a:schemeClr val="dk1"/>
+          </a:lnRef>
+          <a:fillRef idx="0">
+            <a:schemeClr val="dk1"/>
+          </a:fillRef>
+          <a:effectRef idx="0">
+            <a:schemeClr val="dk1"/>
+          </a:effectRef>
+          <a:fontRef idx="minor">
+            <a:schemeClr val="tx1"/>
+          </a:fontRef>
+        </p:style>
+      </p:cxnSp>
+      <p:sp>
+        <p:nvSpPr>
+          <p:cNvPr id="26" name="ZoneTexte 25">
+            <a:extLst>
+              <a:ext uri="{FF2B5EF4-FFF2-40B4-BE49-F238E27FC236}">
+                <a16:creationId xmlns:a16="http://schemas.microsoft.com/office/drawing/2014/main" id="{65B612E5-1CFD-9CCF-7EA0-1F78D922BAFE}"/>
+              </a:ext>
+            </a:extLst>
+          </p:cNvPr>
+          <p:cNvSpPr txBox="1"/>
+          <p:nvPr/>
+        </p:nvSpPr>
+        <p:spPr>
+          <a:xfrm>
+            <a:off x="4404714" y="177775"/>
+            <a:ext cx="2333070" cy="307777"/>
+          </a:xfrm>
+          <a:prstGeom prst="rect">
+            <a:avLst/>
+          </a:prstGeom>
+          <a:noFill/>
+        </p:spPr>
+        <p:txBody>
+          <a:bodyPr wrap="square" rtlCol="0">
+            <a:spAutoFit/>
+          </a:bodyPr>
+          <a:lstStyle/>
+          <a:p>
+            <a:r>
+              <a:rPr lang="fr-FR" sz="1400" b="1" dirty="0">
+                <a:effectLst>
+                  <a:outerShdw blurRad="38100" dist="38100" dir="2700000" algn="tl">
+                    <a:srgbClr val="000000">
+                      <a:alpha val="43137"/>
+                    </a:srgbClr>
+                  </a:outerShdw>
+                </a:effectLst>
+              </a:rPr>
+              <a:t>Workflow </a:t>
+            </a:r>
+            <a:r>
+              <a:rPr lang="fr-FR" sz="1400" b="1" dirty="0" err="1">
+                <a:effectLst>
+                  <a:outerShdw blurRad="38100" dist="38100" dir="2700000" algn="tl">
+                    <a:srgbClr val="000000">
+                      <a:alpha val="43137"/>
+                    </a:srgbClr>
+                  </a:outerShdw>
+                </a:effectLst>
+              </a:rPr>
+              <a:t>scRNAseq-CITEseq</a:t>
+            </a:r>
+            <a:endParaRPr lang="fr-FR" sz="1400" b="1" dirty="0">
+              <a:effectLst>
+                <a:outerShdw blurRad="38100" dist="38100" dir="2700000" algn="tl">
+                  <a:srgbClr val="000000">
+                    <a:alpha val="43137"/>
+                  </a:srgbClr>
+                </a:outerShdw>
+              </a:effectLst>
+            </a:endParaRPr>
+          </a:p>
+        </p:txBody>
+      </p:sp>
+      <p:sp>
+        <p:nvSpPr>
+          <p:cNvPr id="27" name="ZoneTexte 26">
+            <a:extLst>
+              <a:ext uri="{FF2B5EF4-FFF2-40B4-BE49-F238E27FC236}">
+                <a16:creationId xmlns:a16="http://schemas.microsoft.com/office/drawing/2014/main" id="{3377F037-A9A6-A286-FDC7-7FBEE69B4AE5}"/>
+              </a:ext>
+            </a:extLst>
+          </p:cNvPr>
+          <p:cNvSpPr txBox="1"/>
+          <p:nvPr/>
+        </p:nvSpPr>
+        <p:spPr>
+          <a:xfrm>
+            <a:off x="3385137" y="4238853"/>
+            <a:ext cx="2153845" cy="461665"/>
+          </a:xfrm>
+          <a:prstGeom prst="rect">
+            <a:avLst/>
+          </a:prstGeom>
+          <a:noFill/>
+        </p:spPr>
+        <p:txBody>
+          <a:bodyPr wrap="square" rtlCol="0">
+            <a:spAutoFit/>
+          </a:bodyPr>
+          <a:lstStyle/>
+          <a:p>
+            <a:pPr algn="ctr"/>
+            <a:r>
+              <a:rPr lang="fr-FR" sz="1200" i="1" u="sng" dirty="0" err="1">
+                <a:solidFill>
+                  <a:srgbClr val="002060"/>
+                </a:solidFill>
+              </a:rPr>
+              <a:t>Two</a:t>
+            </a:r>
+            <a:r>
+              <a:rPr lang="fr-FR" sz="1200" i="1" u="sng" dirty="0">
+                <a:solidFill>
+                  <a:srgbClr val="002060"/>
+                </a:solidFill>
+              </a:rPr>
+              <a:t> possible normalisations for </a:t>
+            </a:r>
+            <a:r>
+              <a:rPr lang="fr-FR" sz="1200" i="1" u="sng" dirty="0" err="1">
+                <a:solidFill>
+                  <a:srgbClr val="002060"/>
+                </a:solidFill>
+              </a:rPr>
+              <a:t>each</a:t>
+            </a:r>
+            <a:r>
+              <a:rPr lang="fr-FR" sz="1200" i="1" u="sng" dirty="0">
+                <a:solidFill>
+                  <a:srgbClr val="002060"/>
+                </a:solidFill>
+              </a:rPr>
+              <a:t> combination</a:t>
+            </a:r>
+          </a:p>
+        </p:txBody>
+      </p:sp>
+      <p:cxnSp>
+        <p:nvCxnSpPr>
+          <p:cNvPr id="29" name="Connecteur droit avec flèche 28">
+            <a:extLst>
+              <a:ext uri="{FF2B5EF4-FFF2-40B4-BE49-F238E27FC236}">
+                <a16:creationId xmlns:a16="http://schemas.microsoft.com/office/drawing/2014/main" id="{BC0F1E8E-20C5-B3D6-8DBB-244479CCED98}"/>
+              </a:ext>
+            </a:extLst>
+          </p:cNvPr>
+          <p:cNvCxnSpPr>
+            <a:cxnSpLocks/>
+          </p:cNvCxnSpPr>
+          <p:nvPr/>
+        </p:nvCxnSpPr>
+        <p:spPr>
+          <a:xfrm flipH="1">
+            <a:off x="3214399" y="4354340"/>
+            <a:ext cx="1122373" cy="630269"/>
+          </a:xfrm>
+          <a:prstGeom prst="straightConnector1">
+            <a:avLst/>
+          </a:prstGeom>
+          <a:ln>
+            <a:tailEnd type="triangle"/>
+          </a:ln>
+        </p:spPr>
+        <p:style>
+          <a:lnRef idx="1">
+            <a:schemeClr val="dk1"/>
+          </a:lnRef>
+          <a:fillRef idx="0">
+            <a:schemeClr val="dk1"/>
+          </a:fillRef>
+          <a:effectRef idx="0">
+            <a:schemeClr val="dk1"/>
+          </a:effectRef>
+          <a:fontRef idx="minor">
+            <a:schemeClr val="tx1"/>
+          </a:fontRef>
+        </p:style>
+      </p:cxnSp>
+      <p:cxnSp>
+        <p:nvCxnSpPr>
+          <p:cNvPr id="32" name="Connecteur droit avec flèche 31">
+            <a:extLst>
+              <a:ext uri="{FF2B5EF4-FFF2-40B4-BE49-F238E27FC236}">
+                <a16:creationId xmlns:a16="http://schemas.microsoft.com/office/drawing/2014/main" id="{E1153E48-3A12-8F19-E3F3-F9336BE496A8}"/>
+              </a:ext>
+            </a:extLst>
+          </p:cNvPr>
+          <p:cNvCxnSpPr/>
+          <p:nvPr/>
+        </p:nvCxnSpPr>
+        <p:spPr>
+          <a:xfrm flipH="1">
+            <a:off x="3275815" y="4354340"/>
+            <a:ext cx="1060957" cy="1502974"/>
+          </a:xfrm>
+          <a:prstGeom prst="straightConnector1">
+            <a:avLst/>
+          </a:prstGeom>
+          <a:ln>
+            <a:tailEnd type="triangle"/>
+          </a:ln>
+        </p:spPr>
+        <p:style>
+          <a:lnRef idx="1">
+            <a:schemeClr val="dk1"/>
+          </a:lnRef>
+          <a:fillRef idx="0">
+            <a:schemeClr val="dk1"/>
+          </a:fillRef>
+          <a:effectRef idx="0">
+            <a:schemeClr val="dk1"/>
+          </a:effectRef>
+          <a:fontRef idx="minor">
+            <a:schemeClr val="tx1"/>
+          </a:fontRef>
+        </p:style>
+      </p:cxnSp>
+      <p:cxnSp>
+        <p:nvCxnSpPr>
+          <p:cNvPr id="34" name="Connecteur droit avec flèche 33">
+            <a:extLst>
+              <a:ext uri="{FF2B5EF4-FFF2-40B4-BE49-F238E27FC236}">
+                <a16:creationId xmlns:a16="http://schemas.microsoft.com/office/drawing/2014/main" id="{B6F50F6C-D5DA-D995-98C1-BF8F1B0B6005}"/>
+              </a:ext>
+            </a:extLst>
+          </p:cNvPr>
+          <p:cNvCxnSpPr/>
+          <p:nvPr/>
+        </p:nvCxnSpPr>
+        <p:spPr>
+          <a:xfrm>
+            <a:off x="4336772" y="4357492"/>
+            <a:ext cx="750249" cy="960997"/>
+          </a:xfrm>
+          <a:prstGeom prst="straightConnector1">
+            <a:avLst/>
+          </a:prstGeom>
+          <a:ln>
+            <a:tailEnd type="triangle"/>
+          </a:ln>
+        </p:spPr>
+        <p:style>
+          <a:lnRef idx="1">
+            <a:schemeClr val="dk1"/>
+          </a:lnRef>
+          <a:fillRef idx="0">
+            <a:schemeClr val="dk1"/>
+          </a:fillRef>
+          <a:effectRef idx="0">
+            <a:schemeClr val="dk1"/>
+          </a:effectRef>
+          <a:fontRef idx="minor">
+            <a:schemeClr val="tx1"/>
+          </a:fontRef>
+        </p:style>
+      </p:cxnSp>
+      <p:sp>
+        <p:nvSpPr>
+          <p:cNvPr id="3" name="ZoneTexte 2">
+            <a:extLst>
+              <a:ext uri="{FF2B5EF4-FFF2-40B4-BE49-F238E27FC236}">
+                <a16:creationId xmlns:a16="http://schemas.microsoft.com/office/drawing/2014/main" id="{C67CD655-A3A1-8FF8-F432-53088F320D1E}"/>
+              </a:ext>
+            </a:extLst>
+          </p:cNvPr>
+          <p:cNvSpPr txBox="1"/>
+          <p:nvPr/>
+        </p:nvSpPr>
+        <p:spPr>
+          <a:xfrm rot="16200000">
+            <a:off x="4607954" y="2488050"/>
+            <a:ext cx="3564548" cy="369332"/>
+          </a:xfrm>
+          <a:prstGeom prst="rect">
+            <a:avLst/>
+          </a:prstGeom>
+          <a:noFill/>
+        </p:spPr>
+        <p:txBody>
+          <a:bodyPr wrap="square" rtlCol="0">
+            <a:spAutoFit/>
+          </a:bodyPr>
+          <a:lstStyle/>
+          <a:p>
+            <a:pPr algn="ctr"/>
+            <a:r>
+              <a:rPr lang="fr-FR" b="1" dirty="0">
+                <a:solidFill>
+                  <a:schemeClr val="bg1">
+                    <a:lumMod val="65000"/>
+                  </a:schemeClr>
+                </a:solidFill>
+              </a:rPr>
+              <a:t>DATA CLEANING AND FILTERING</a:t>
+            </a:r>
+          </a:p>
+        </p:txBody>
+      </p:sp>
+      <p:sp>
+        <p:nvSpPr>
+          <p:cNvPr id="18" name="ZoneTexte 17">
+            <a:extLst>
+              <a:ext uri="{FF2B5EF4-FFF2-40B4-BE49-F238E27FC236}">
+                <a16:creationId xmlns:a16="http://schemas.microsoft.com/office/drawing/2014/main" id="{03935B7D-30C8-E939-932E-F2CC802BB209}"/>
+              </a:ext>
+            </a:extLst>
+          </p:cNvPr>
+          <p:cNvSpPr txBox="1"/>
+          <p:nvPr/>
+        </p:nvSpPr>
+        <p:spPr>
+          <a:xfrm rot="16200000">
+            <a:off x="4984313" y="7226967"/>
+            <a:ext cx="2825086" cy="369332"/>
+          </a:xfrm>
+          <a:prstGeom prst="rect">
+            <a:avLst/>
+          </a:prstGeom>
+          <a:noFill/>
+        </p:spPr>
+        <p:txBody>
+          <a:bodyPr wrap="square" rtlCol="0">
+            <a:spAutoFit/>
+          </a:bodyPr>
+          <a:lstStyle/>
+          <a:p>
+            <a:r>
+              <a:rPr lang="fr-FR" b="1" dirty="0">
+                <a:solidFill>
+                  <a:schemeClr val="bg1">
+                    <a:lumMod val="65000"/>
+                  </a:schemeClr>
+                </a:solidFill>
+              </a:rPr>
+              <a:t>DOWNSTREAM ANALYSIS</a:t>
+            </a:r>
+          </a:p>
+        </p:txBody>
+      </p:sp>
+      <p:sp>
+        <p:nvSpPr>
+          <p:cNvPr id="7" name="ZoneTexte 6">
+            <a:extLst>
+              <a:ext uri="{FF2B5EF4-FFF2-40B4-BE49-F238E27FC236}">
+                <a16:creationId xmlns:a16="http://schemas.microsoft.com/office/drawing/2014/main" id="{A441D966-D51A-EB5D-0D55-375D9545457D}"/>
+              </a:ext>
+            </a:extLst>
+          </p:cNvPr>
+          <p:cNvSpPr txBox="1"/>
+          <p:nvPr/>
+        </p:nvSpPr>
+        <p:spPr>
+          <a:xfrm>
+            <a:off x="2533821" y="3729533"/>
+            <a:ext cx="3640738" cy="307777"/>
+          </a:xfrm>
+          <a:prstGeom prst="rect">
+            <a:avLst/>
+          </a:prstGeom>
+          <a:solidFill>
+            <a:schemeClr val="accent5">
+              <a:lumMod val="20000"/>
+              <a:lumOff val="80000"/>
+            </a:schemeClr>
+          </a:solidFill>
+        </p:spPr>
+        <p:txBody>
+          <a:bodyPr wrap="square" rtlCol="0">
+            <a:spAutoFit/>
+          </a:bodyPr>
+          <a:lstStyle/>
+          <a:p>
+            <a:pPr algn="ctr"/>
+            <a:r>
+              <a:rPr lang="fr-FR" sz="1400" dirty="0" err="1"/>
+              <a:t>scRNAseq_CITEseq_integ_ReductionDoublets</a:t>
+            </a:r>
+            <a:endParaRPr lang="fr-FR" sz="1400" dirty="0"/>
+          </a:p>
+        </p:txBody>
+      </p:sp>
+    </p:spTree>
+    <p:extLst>
+      <p:ext uri="{BB962C8B-B14F-4D97-AF65-F5344CB8AC3E}">
+        <p14:creationId xmlns:p14="http://schemas.microsoft.com/office/powerpoint/2010/main" val="585316670"/>
       </p:ext>
     </p:extLst>
   </p:cSld>

</xml_diff>